<commit_message>
Added Changes to the upload button
</commit_message>
<xml_diff>
--- a/mp-web/images ppt.pptx
+++ b/mp-web/images ppt.pptx
@@ -7,6 +7,7 @@
   <p:sldIdLst>
     <p:sldId id="256" r:id="rId2"/>
     <p:sldId id="257" r:id="rId3"/>
+    <p:sldId id="258" r:id="rId4"/>
   </p:sldIdLst>
   <p:sldSz cx="12192000" cy="6858000"/>
   <p:notesSz cx="6858000" cy="9144000"/>
@@ -105,6 +106,11 @@
       </a:defRPr>
     </a:lvl9pPr>
   </p:defaultTextStyle>
+  <p:extLst>
+    <p:ext uri="{EFAFB233-063F-42B5-8137-9DF3F51BA10A}">
+      <p15:sldGuideLst xmlns:p15="http://schemas.microsoft.com/office/powerpoint/2012/main"/>
+    </p:ext>
+  </p:extLst>
 </p:presentation>
 </file>
 
@@ -239,7 +245,7 @@
           <a:p>
             <a:fld id="{CA7CDEB7-B58A-4B55-8621-62E69BE6BFBB}" type="datetimeFigureOut">
               <a:rPr lang="en-US" smtClean="0"/>
-              <a:t>22-Jan-19</a:t>
+              <a:t>29-Jan-19</a:t>
             </a:fld>
             <a:endParaRPr lang="en-US"/>
           </a:p>
@@ -409,7 +415,7 @@
           <a:p>
             <a:fld id="{CA7CDEB7-B58A-4B55-8621-62E69BE6BFBB}" type="datetimeFigureOut">
               <a:rPr lang="en-US" smtClean="0"/>
-              <a:t>22-Jan-19</a:t>
+              <a:t>29-Jan-19</a:t>
             </a:fld>
             <a:endParaRPr lang="en-US"/>
           </a:p>
@@ -589,7 +595,7 @@
           <a:p>
             <a:fld id="{CA7CDEB7-B58A-4B55-8621-62E69BE6BFBB}" type="datetimeFigureOut">
               <a:rPr lang="en-US" smtClean="0"/>
-              <a:t>22-Jan-19</a:t>
+              <a:t>29-Jan-19</a:t>
             </a:fld>
             <a:endParaRPr lang="en-US"/>
           </a:p>
@@ -759,7 +765,7 @@
           <a:p>
             <a:fld id="{CA7CDEB7-B58A-4B55-8621-62E69BE6BFBB}" type="datetimeFigureOut">
               <a:rPr lang="en-US" smtClean="0"/>
-              <a:t>22-Jan-19</a:t>
+              <a:t>29-Jan-19</a:t>
             </a:fld>
             <a:endParaRPr lang="en-US"/>
           </a:p>
@@ -1005,7 +1011,7 @@
           <a:p>
             <a:fld id="{CA7CDEB7-B58A-4B55-8621-62E69BE6BFBB}" type="datetimeFigureOut">
               <a:rPr lang="en-US" smtClean="0"/>
-              <a:t>22-Jan-19</a:t>
+              <a:t>29-Jan-19</a:t>
             </a:fld>
             <a:endParaRPr lang="en-US"/>
           </a:p>
@@ -1237,7 +1243,7 @@
           <a:p>
             <a:fld id="{CA7CDEB7-B58A-4B55-8621-62E69BE6BFBB}" type="datetimeFigureOut">
               <a:rPr lang="en-US" smtClean="0"/>
-              <a:t>22-Jan-19</a:t>
+              <a:t>29-Jan-19</a:t>
             </a:fld>
             <a:endParaRPr lang="en-US"/>
           </a:p>
@@ -1604,7 +1610,7 @@
           <a:p>
             <a:fld id="{CA7CDEB7-B58A-4B55-8621-62E69BE6BFBB}" type="datetimeFigureOut">
               <a:rPr lang="en-US" smtClean="0"/>
-              <a:t>22-Jan-19</a:t>
+              <a:t>29-Jan-19</a:t>
             </a:fld>
             <a:endParaRPr lang="en-US"/>
           </a:p>
@@ -1722,7 +1728,7 @@
           <a:p>
             <a:fld id="{CA7CDEB7-B58A-4B55-8621-62E69BE6BFBB}" type="datetimeFigureOut">
               <a:rPr lang="en-US" smtClean="0"/>
-              <a:t>22-Jan-19</a:t>
+              <a:t>29-Jan-19</a:t>
             </a:fld>
             <a:endParaRPr lang="en-US"/>
           </a:p>
@@ -1817,7 +1823,7 @@
           <a:p>
             <a:fld id="{CA7CDEB7-B58A-4B55-8621-62E69BE6BFBB}" type="datetimeFigureOut">
               <a:rPr lang="en-US" smtClean="0"/>
-              <a:t>22-Jan-19</a:t>
+              <a:t>29-Jan-19</a:t>
             </a:fld>
             <a:endParaRPr lang="en-US"/>
           </a:p>
@@ -2094,7 +2100,7 @@
           <a:p>
             <a:fld id="{CA7CDEB7-B58A-4B55-8621-62E69BE6BFBB}" type="datetimeFigureOut">
               <a:rPr lang="en-US" smtClean="0"/>
-              <a:t>22-Jan-19</a:t>
+              <a:t>29-Jan-19</a:t>
             </a:fld>
             <a:endParaRPr lang="en-US"/>
           </a:p>
@@ -2351,7 +2357,7 @@
           <a:p>
             <a:fld id="{CA7CDEB7-B58A-4B55-8621-62E69BE6BFBB}" type="datetimeFigureOut">
               <a:rPr lang="en-US" smtClean="0"/>
-              <a:t>22-Jan-19</a:t>
+              <a:t>29-Jan-19</a:t>
             </a:fld>
             <a:endParaRPr lang="en-US"/>
           </a:p>
@@ -2564,7 +2570,7 @@
           <a:p>
             <a:fld id="{CA7CDEB7-B58A-4B55-8621-62E69BE6BFBB}" type="datetimeFigureOut">
               <a:rPr lang="en-US" smtClean="0"/>
-              <a:t>22-Jan-19</a:t>
+              <a:t>29-Jan-19</a:t>
             </a:fld>
             <a:endParaRPr lang="en-US"/>
           </a:p>
@@ -3154,6 +3160,116 @@
 </p:sld>
 </file>
 
+<file path=ppt/slides/slide3.xml><?xml version="1.0" encoding="utf-8"?>
+<p:sld xmlns:a="http://schemas.openxmlformats.org/drawingml/2006/main" xmlns:r="http://schemas.openxmlformats.org/officeDocument/2006/relationships" xmlns:p="http://schemas.openxmlformats.org/presentationml/2006/main">
+  <p:cSld>
+    <p:bg>
+      <p:bgPr>
+        <a:solidFill>
+          <a:schemeClr val="bg1"/>
+        </a:solidFill>
+        <a:effectLst/>
+      </p:bgPr>
+    </p:bg>
+    <p:spTree>
+      <p:nvGrpSpPr>
+        <p:cNvPr id="1" name=""/>
+        <p:cNvGrpSpPr/>
+        <p:nvPr/>
+      </p:nvGrpSpPr>
+      <p:grpSpPr>
+        <a:xfrm>
+          <a:off x="0" y="0"/>
+          <a:ext cx="0" cy="0"/>
+          <a:chOff x="0" y="0"/>
+          <a:chExt cx="0" cy="0"/>
+        </a:xfrm>
+      </p:grpSpPr>
+      <p:pic>
+        <p:nvPicPr>
+          <p:cNvPr id="7" name="Picture 6" descr="A picture containing clothing&#10;&#10;Description automatically generated">
+            <a:extLst>
+              <a:ext uri="{FF2B5EF4-FFF2-40B4-BE49-F238E27FC236}">
+                <a16:creationId xmlns:a16="http://schemas.microsoft.com/office/drawing/2014/main" id="{98B91B07-3C24-40BF-87CA-6C7F53F3924F}"/>
+              </a:ext>
+            </a:extLst>
+          </p:cNvPr>
+          <p:cNvPicPr>
+            <a:picLocks noChangeAspect="1"/>
+          </p:cNvPicPr>
+          <p:nvPr/>
+        </p:nvPicPr>
+        <p:blipFill>
+          <a:blip r:embed="rId2">
+            <a:extLst>
+              <a:ext uri="{28A0092B-C50C-407E-A947-70E740481C1C}">
+                <a14:useLocalDpi xmlns:a14="http://schemas.microsoft.com/office/drawing/2010/main" val="0"/>
+              </a:ext>
+            </a:extLst>
+          </a:blip>
+          <a:stretch>
+            <a:fillRect/>
+          </a:stretch>
+        </p:blipFill>
+        <p:spPr>
+          <a:xfrm>
+            <a:off x="1571624" y="1003565"/>
+            <a:ext cx="4363511" cy="2526770"/>
+          </a:xfrm>
+          <a:prstGeom prst="rect">
+            <a:avLst/>
+          </a:prstGeom>
+        </p:spPr>
+      </p:pic>
+      <p:pic>
+        <p:nvPicPr>
+          <p:cNvPr id="5" name="Picture 4" descr="A picture containing handwear&#10;&#10;Description automatically generated">
+            <a:extLst>
+              <a:ext uri="{FF2B5EF4-FFF2-40B4-BE49-F238E27FC236}">
+                <a16:creationId xmlns:a16="http://schemas.microsoft.com/office/drawing/2014/main" id="{3C34FA38-101D-4D83-8ACA-106F39549299}"/>
+              </a:ext>
+            </a:extLst>
+          </p:cNvPr>
+          <p:cNvPicPr>
+            <a:picLocks noChangeAspect="1"/>
+          </p:cNvPicPr>
+          <p:nvPr/>
+        </p:nvPicPr>
+        <p:blipFill>
+          <a:blip r:embed="rId3">
+            <a:extLst>
+              <a:ext uri="{28A0092B-C50C-407E-A947-70E740481C1C}">
+                <a14:useLocalDpi xmlns:a14="http://schemas.microsoft.com/office/drawing/2010/main" val="0"/>
+              </a:ext>
+            </a:extLst>
+          </a:blip>
+          <a:stretch>
+            <a:fillRect/>
+          </a:stretch>
+        </p:blipFill>
+        <p:spPr>
+          <a:xfrm>
+            <a:off x="6256867" y="1017323"/>
+            <a:ext cx="4363509" cy="2487083"/>
+          </a:xfrm>
+          <a:prstGeom prst="rect">
+            <a:avLst/>
+          </a:prstGeom>
+        </p:spPr>
+      </p:pic>
+    </p:spTree>
+    <p:extLst>
+      <p:ext uri="{BB962C8B-B14F-4D97-AF65-F5344CB8AC3E}">
+        <p14:creationId xmlns:p14="http://schemas.microsoft.com/office/powerpoint/2010/main" val="3841354807"/>
+      </p:ext>
+    </p:extLst>
+  </p:cSld>
+  <p:clrMapOvr>
+    <a:masterClrMapping/>
+  </p:clrMapOvr>
+</p:sld>
+</file>
+
 <file path=ppt/theme/theme1.xml><?xml version="1.0" encoding="utf-8"?>
 <a:theme xmlns:a="http://schemas.openxmlformats.org/drawingml/2006/main" name="Office Theme">
   <a:themeElements>

</xml_diff>